<commit_message>
renaming some directories, adding spectral bathymetry to laprise and peltier, adding spectral_bathy.m function too
</commit_message>
<xml_diff>
--- a/nondimensional/system_sketches.pptx
+++ b/nondimensional/system_sketches.pptx
@@ -5067,7 +5067,7 @@
             </p:nvSpPr>
             <p:spPr>
               <a:xfrm>
-                <a:off x="3041419" y="2874485"/>
+                <a:off x="3176440" y="2903273"/>
                 <a:ext cx="1865382" cy="761683"/>
               </a:xfrm>
               <a:prstGeom prst="rect">
@@ -5311,7 +5311,7 @@
             </p:nvSpPr>
             <p:spPr>
               <a:xfrm>
-                <a:off x="3041419" y="2874485"/>
+                <a:off x="3176440" y="2903273"/>
                 <a:ext cx="1865382" cy="761683"/>
               </a:xfrm>
               <a:prstGeom prst="rect">

</xml_diff>